<commit_message>
Deployed b1235b3 to 0.5 with MkDocs 1.1.2 and mike 1.0.0
</commit_message>
<xml_diff>
--- a/0.5/images/src/illustration.pptx
+++ b/0.5/images/src/illustration.pptx
@@ -197,7 +197,7 @@
           <a:p>
             <a:fld id="{38B78CBE-37FA-D241-BB4C-CAC5D3B25F49}" type="datetimeFigureOut">
               <a:rPr lang="en-US" smtClean="0"/>
-              <a:t>5/2/21</a:t>
+              <a:t>5/27/21</a:t>
             </a:fld>
             <a:endParaRPr lang="en-US"/>
           </a:p>
@@ -695,7 +695,7 @@
           <a:p>
             <a:fld id="{708812C5-0212-FD42-A0D4-E2E8FF4E3AF5}" type="datetime1">
               <a:rPr lang="en-US" smtClean="0"/>
-              <a:t>5/2/21</a:t>
+              <a:t>5/27/21</a:t>
             </a:fld>
             <a:endParaRPr lang="en-US"/>
           </a:p>
@@ -896,7 +896,7 @@
           <a:p>
             <a:fld id="{D232AC6F-41C3-B34B-9BAA-03ED2F3BC0F6}" type="datetime1">
               <a:rPr lang="en-US" smtClean="0"/>
-              <a:t>5/2/21</a:t>
+              <a:t>5/27/21</a:t>
             </a:fld>
             <a:endParaRPr lang="en-US"/>
           </a:p>
@@ -1107,7 +1107,7 @@
           <a:p>
             <a:fld id="{BEE140C2-F440-9D49-95CB-5965D64CC4A2}" type="datetime1">
               <a:rPr lang="en-US" smtClean="0"/>
-              <a:t>5/2/21</a:t>
+              <a:t>5/27/21</a:t>
             </a:fld>
             <a:endParaRPr lang="en-US"/>
           </a:p>
@@ -1308,7 +1308,7 @@
           <a:p>
             <a:fld id="{CC99F980-FB29-FD47-8508-150F73F1E8B0}" type="datetime1">
               <a:rPr lang="en-US" smtClean="0"/>
-              <a:t>5/2/21</a:t>
+              <a:t>5/27/21</a:t>
             </a:fld>
             <a:endParaRPr lang="en-US"/>
           </a:p>
@@ -1586,7 +1586,7 @@
           <a:p>
             <a:fld id="{D4510983-EA22-9643-8AC0-B3C6499B643B}" type="datetime1">
               <a:rPr lang="en-US" smtClean="0"/>
-              <a:t>5/2/21</a:t>
+              <a:t>5/27/21</a:t>
             </a:fld>
             <a:endParaRPr lang="en-US"/>
           </a:p>
@@ -1854,7 +1854,7 @@
           <a:p>
             <a:fld id="{D5A39195-967D-5D4E-8C6A-C99866996458}" type="datetime1">
               <a:rPr lang="en-US" smtClean="0"/>
-              <a:t>5/2/21</a:t>
+              <a:t>5/27/21</a:t>
             </a:fld>
             <a:endParaRPr lang="en-US"/>
           </a:p>
@@ -2269,7 +2269,7 @@
           <a:p>
             <a:fld id="{5AD771E9-C79D-684D-A158-5EB6E92DE947}" type="datetime1">
               <a:rPr lang="en-US" smtClean="0"/>
-              <a:t>5/2/21</a:t>
+              <a:t>5/27/21</a:t>
             </a:fld>
             <a:endParaRPr lang="en-US"/>
           </a:p>
@@ -2413,7 +2413,7 @@
           <a:p>
             <a:fld id="{693CA161-7E4C-5C4B-B799-DB602A0B9806}" type="datetime1">
               <a:rPr lang="en-US" smtClean="0"/>
-              <a:t>5/2/21</a:t>
+              <a:t>5/27/21</a:t>
             </a:fld>
             <a:endParaRPr lang="en-US"/>
           </a:p>
@@ -2529,7 +2529,7 @@
           <a:p>
             <a:fld id="{6D55FDF3-8BB2-6349-A5FA-057F3D78953D}" type="datetime1">
               <a:rPr lang="en-US" smtClean="0"/>
-              <a:t>5/2/21</a:t>
+              <a:t>5/27/21</a:t>
             </a:fld>
             <a:endParaRPr lang="en-US"/>
           </a:p>
@@ -2843,7 +2843,7 @@
           <a:p>
             <a:fld id="{EEDFACC0-3228-BA4B-942E-CEF38B0101FD}" type="datetime1">
               <a:rPr lang="en-US" smtClean="0"/>
-              <a:t>5/2/21</a:t>
+              <a:t>5/27/21</a:t>
             </a:fld>
             <a:endParaRPr lang="en-US"/>
           </a:p>
@@ -3134,7 +3134,7 @@
           <a:p>
             <a:fld id="{07EEEDBE-E24C-D140-B419-6D8D592D0F1C}" type="datetime1">
               <a:rPr lang="en-US" smtClean="0"/>
-              <a:t>5/2/21</a:t>
+              <a:t>5/27/21</a:t>
             </a:fld>
             <a:endParaRPr lang="en-US"/>
           </a:p>
@@ -3378,7 +3378,7 @@
           <a:p>
             <a:fld id="{E05781A2-A5EF-C54C-A3EF-F62483D37EDC}" type="datetime1">
               <a:rPr lang="en-US" smtClean="0"/>
-              <a:t>5/2/21</a:t>
+              <a:t>5/27/21</a:t>
             </a:fld>
             <a:endParaRPr lang="en-US"/>
           </a:p>
@@ -3801,63 +3801,6 @@
       </p:grpSpPr>
       <p:sp>
         <p:nvSpPr>
-          <p:cNvPr id="2" name="Footer Placeholder 1">
-            <a:extLst>
-              <a:ext uri="{FF2B5EF4-FFF2-40B4-BE49-F238E27FC236}">
-                <a16:creationId xmlns:a16="http://schemas.microsoft.com/office/drawing/2014/main" id="{CAF876A6-21EF-6949-9DC3-C0A99675CD1E}"/>
-              </a:ext>
-            </a:extLst>
-          </p:cNvPr>
-          <p:cNvSpPr>
-            <a:spLocks noGrp="1"/>
-          </p:cNvSpPr>
-          <p:nvPr>
-            <p:ph type="ftr" sz="quarter" idx="11"/>
-          </p:nvPr>
-        </p:nvSpPr>
-        <p:spPr/>
-        <p:txBody>
-          <a:bodyPr/>
-          <a:lstStyle/>
-          <a:p>
-            <a:r>
-              <a:rPr lang="en-US" dirty="0"/>
-              <a:t>https://iter8.tools</a:t>
-            </a:r>
-          </a:p>
-        </p:txBody>
-      </p:sp>
-      <p:sp>
-        <p:nvSpPr>
-          <p:cNvPr id="3" name="Slide Number Placeholder 2">
-            <a:extLst>
-              <a:ext uri="{FF2B5EF4-FFF2-40B4-BE49-F238E27FC236}">
-                <a16:creationId xmlns:a16="http://schemas.microsoft.com/office/drawing/2014/main" id="{8986A4B5-D9A6-BA4A-AE84-82889CB87602}"/>
-              </a:ext>
-            </a:extLst>
-          </p:cNvPr>
-          <p:cNvSpPr>
-            <a:spLocks noGrp="1"/>
-          </p:cNvSpPr>
-          <p:nvPr>
-            <p:ph type="sldNum" sz="quarter" idx="12"/>
-          </p:nvPr>
-        </p:nvSpPr>
-        <p:spPr/>
-        <p:txBody>
-          <a:bodyPr/>
-          <a:lstStyle/>
-          <a:p>
-            <a:fld id="{B78E2DF1-CA0F-8745-8AE1-A3A61670CB1B}" type="slidenum">
-              <a:rPr lang="en-US" smtClean="0"/>
-              <a:t>1</a:t>
-            </a:fld>
-            <a:endParaRPr lang="en-US"/>
-          </a:p>
-        </p:txBody>
-      </p:sp>
-      <p:sp>
-        <p:nvSpPr>
           <p:cNvPr id="54" name="Rounded Rectangle 53">
             <a:extLst>
               <a:ext uri="{FF2B5EF4-FFF2-40B4-BE49-F238E27FC236}">
@@ -3870,8 +3813,8 @@
         </p:nvSpPr>
         <p:spPr>
           <a:xfrm>
-            <a:off x="4866290" y="3795607"/>
-            <a:ext cx="4376458" cy="1395986"/>
+            <a:off x="4581297" y="3364682"/>
+            <a:ext cx="5992110" cy="1489732"/>
           </a:xfrm>
           <a:prstGeom prst="roundRect">
             <a:avLst/>
@@ -3914,13 +3857,51 @@
                   <a:srgbClr val="7A004A"/>
                 </a:solidFill>
               </a:rPr>
-              <a:t>Automate A/B(/n), Canary, and Conformance experiments</a:t>
-            </a:r>
-            <a:endParaRPr lang="en-US" sz="2000" dirty="0">
-              <a:solidFill>
-                <a:schemeClr val="tx1"/>
-              </a:solidFill>
-            </a:endParaRPr>
+              <a:t>Automate releases &amp; experiments </a:t>
+            </a:r>
+            <a:r>
+              <a:rPr lang="en-US" sz="2000" dirty="0">
+                <a:solidFill>
+                  <a:schemeClr val="tx1"/>
+                </a:solidFill>
+              </a:rPr>
+              <a:t>for</a:t>
+            </a:r>
+            <a:r>
+              <a:rPr lang="en-US" sz="2000" b="1" dirty="0">
+                <a:solidFill>
+                  <a:srgbClr val="7A004A"/>
+                </a:solidFill>
+              </a:rPr>
+              <a:t> </a:t>
+            </a:r>
+          </a:p>
+          <a:p>
+            <a:pPr algn="ctr"/>
+            <a:r>
+              <a:rPr lang="en-US" sz="2000" dirty="0">
+                <a:solidFill>
+                  <a:schemeClr val="tx1"/>
+                </a:solidFill>
+              </a:rPr>
+              <a:t>Kubernetes</a:t>
+            </a:r>
+            <a:r>
+              <a:rPr lang="en-US" sz="2000" b="1" dirty="0">
+                <a:solidFill>
+                  <a:srgbClr val="7A004A"/>
+                </a:solidFill>
+              </a:rPr>
+              <a:t> </a:t>
+            </a:r>
+            <a:r>
+              <a:rPr lang="en-US" sz="2000" dirty="0">
+                <a:solidFill>
+                  <a:schemeClr val="tx1"/>
+                </a:solidFill>
+              </a:rPr>
+              <a:t>applications and ML models</a:t>
+            </a:r>
           </a:p>
         </p:txBody>
       </p:sp>
@@ -3938,8 +3919,8 @@
         </p:nvSpPr>
         <p:spPr>
           <a:xfrm>
-            <a:off x="3205655" y="2031427"/>
-            <a:ext cx="3585863" cy="1397573"/>
+            <a:off x="3341187" y="1600502"/>
+            <a:ext cx="3511558" cy="1397573"/>
           </a:xfrm>
           <a:prstGeom prst="roundRect">
             <a:avLst/>
@@ -3982,16 +3963,13 @@
                   <a:srgbClr val="7A004A"/>
                 </a:solidFill>
               </a:rPr>
-              <a:t>Find and promote winning version </a:t>
-            </a:r>
-            <a:r>
-              <a:rPr lang="en-US" sz="2000" dirty="0">
-                <a:solidFill>
-                  <a:schemeClr val="tx1"/>
-                </a:solidFill>
-              </a:rPr>
-              <a:t>of your app/ML model</a:t>
-            </a:r>
+              <a:t>Find and safely promote winning version</a:t>
+            </a:r>
+            <a:endParaRPr lang="en-US" sz="2000" dirty="0">
+              <a:solidFill>
+                <a:schemeClr val="tx1"/>
+              </a:solidFill>
+            </a:endParaRPr>
           </a:p>
         </p:txBody>
       </p:sp>
@@ -4023,7 +4001,7 @@
         </p:blipFill>
         <p:spPr>
           <a:xfrm flipH="1">
-            <a:off x="3987823" y="2106861"/>
+            <a:off x="4061398" y="1675936"/>
             <a:ext cx="623353" cy="623353"/>
           </a:xfrm>
           <a:prstGeom prst="rect">
@@ -4059,7 +4037,7 @@
         </p:blipFill>
         <p:spPr>
           <a:xfrm flipH="1">
-            <a:off x="4549766" y="2106861"/>
+            <a:off x="4623341" y="1675936"/>
             <a:ext cx="623353" cy="623353"/>
           </a:xfrm>
           <a:prstGeom prst="rect">
@@ -4095,7 +4073,7 @@
         </p:blipFill>
         <p:spPr>
           <a:xfrm flipH="1">
-            <a:off x="5101198" y="2106861"/>
+            <a:off x="5174773" y="1675936"/>
             <a:ext cx="623353" cy="623353"/>
           </a:xfrm>
           <a:prstGeom prst="rect">
@@ -4131,7 +4109,7 @@
         </p:blipFill>
         <p:spPr>
           <a:xfrm>
-            <a:off x="3195265" y="4074651"/>
+            <a:off x="3341187" y="3690599"/>
             <a:ext cx="837897" cy="837897"/>
           </a:xfrm>
           <a:prstGeom prst="rect">
@@ -4167,8 +4145,8 @@
         </p:nvCxnSpPr>
         <p:spPr>
           <a:xfrm>
-            <a:off x="4033162" y="4493600"/>
-            <a:ext cx="833128" cy="0"/>
+            <a:off x="4179084" y="4109548"/>
+            <a:ext cx="402213" cy="0"/>
           </a:xfrm>
           <a:prstGeom prst="straightConnector1">
             <a:avLst/>
@@ -4227,7 +4205,7 @@
         </p:blipFill>
         <p:spPr bwMode="auto">
           <a:xfrm flipH="1">
-            <a:off x="5099207" y="3905918"/>
+            <a:off x="5130738" y="3517033"/>
             <a:ext cx="505667" cy="498513"/>
           </a:xfrm>
           <a:prstGeom prst="rect">
@@ -4274,7 +4252,7 @@
         </p:blipFill>
         <p:spPr bwMode="auto">
           <a:xfrm>
-            <a:off x="6584339" y="3905631"/>
+            <a:off x="6615870" y="3516746"/>
             <a:ext cx="494256" cy="494256"/>
           </a:xfrm>
           <a:prstGeom prst="rect">
@@ -4321,7 +4299,7 @@
         </p:blipFill>
         <p:spPr bwMode="auto">
           <a:xfrm>
-            <a:off x="5778367" y="3905919"/>
+            <a:off x="5809898" y="3517034"/>
             <a:ext cx="611528" cy="494256"/>
           </a:xfrm>
           <a:prstGeom prst="rect">
@@ -4367,7 +4345,7 @@
         </p:blipFill>
         <p:spPr>
           <a:xfrm>
-            <a:off x="5698791" y="2133854"/>
+            <a:off x="5772366" y="1702929"/>
             <a:ext cx="506616" cy="506616"/>
           </a:xfrm>
           <a:prstGeom prst="rect">
@@ -4403,8 +4381,8 @@
         </p:blipFill>
         <p:spPr>
           <a:xfrm>
-            <a:off x="8460001" y="3944198"/>
-            <a:ext cx="546199" cy="546199"/>
+            <a:off x="9679340" y="3665630"/>
+            <a:ext cx="681704" cy="681704"/>
           </a:xfrm>
           <a:prstGeom prst="rect">
             <a:avLst/>
@@ -4432,8 +4410,8 @@
         </p:nvSpPr>
         <p:spPr>
           <a:xfrm>
-            <a:off x="7064615" y="2033013"/>
-            <a:ext cx="2178133" cy="1395986"/>
+            <a:off x="7414688" y="1602088"/>
+            <a:ext cx="3158719" cy="1395986"/>
           </a:xfrm>
           <a:prstGeom prst="roundRect">
             <a:avLst/>
@@ -4471,20 +4449,31 @@
           <a:p>
             <a:pPr algn="ctr"/>
             <a:r>
+              <a:rPr lang="en-US" sz="2000" dirty="0">
+                <a:solidFill>
+                  <a:schemeClr val="tx1"/>
+                </a:solidFill>
+              </a:rPr>
+              <a:t>Use</a:t>
+            </a:r>
+            <a:r>
               <a:rPr lang="en-US" sz="2000" b="1" dirty="0">
                 <a:solidFill>
                   <a:srgbClr val="7A004A"/>
                 </a:solidFill>
               </a:rPr>
-              <a:t>Use metrics</a:t>
-            </a:r>
+              <a:t> built-in metrics</a:t>
+            </a:r>
+          </a:p>
+          <a:p>
+            <a:pPr algn="ctr"/>
             <a:r>
               <a:rPr lang="en-US" sz="2000" dirty="0">
                 <a:solidFill>
                   <a:schemeClr val="tx1"/>
                 </a:solidFill>
               </a:rPr>
-              <a:t> from </a:t>
+              <a:t>or </a:t>
             </a:r>
             <a:r>
               <a:rPr lang="en-US" sz="2000" b="1" dirty="0">
@@ -4492,24 +4481,13 @@
                   <a:srgbClr val="7A004A"/>
                 </a:solidFill>
               </a:rPr>
-              <a:t>any</a:t>
-            </a:r>
-            <a:r>
-              <a:rPr lang="en-US" sz="2000" b="1" dirty="0">
-                <a:solidFill>
-                  <a:srgbClr val="C00000"/>
-                </a:solidFill>
-              </a:rPr>
-              <a:t> </a:t>
-            </a:r>
-            <a:r>
-              <a:rPr lang="en-US" sz="2000" dirty="0">
-                <a:solidFill>
-                  <a:schemeClr val="tx1"/>
-                </a:solidFill>
-              </a:rPr>
-              <a:t>provider</a:t>
-            </a:r>
+              <a:t>any metric database</a:t>
+            </a:r>
+            <a:endParaRPr lang="en-US" sz="2000" dirty="0">
+              <a:solidFill>
+                <a:schemeClr val="tx1"/>
+              </a:solidFill>
+            </a:endParaRPr>
           </a:p>
         </p:txBody>
       </p:sp>
@@ -4531,8 +4509,8 @@
         </p:nvCxnSpPr>
         <p:spPr>
           <a:xfrm>
-            <a:off x="6791518" y="2730214"/>
-            <a:ext cx="273097" cy="792"/>
+            <a:off x="6852745" y="2299289"/>
+            <a:ext cx="561943" cy="792"/>
           </a:xfrm>
           <a:prstGeom prst="straightConnector1">
             <a:avLst/>
@@ -4580,8 +4558,8 @@
         </p:nvCxnSpPr>
         <p:spPr>
           <a:xfrm rot="16200000" flipV="1">
-            <a:off x="5843250" y="2584338"/>
-            <a:ext cx="366607" cy="2055932"/>
+            <a:off x="6153856" y="1941186"/>
+            <a:ext cx="366607" cy="2480386"/>
           </a:xfrm>
           <a:prstGeom prst="bentConnector3">
             <a:avLst/>
@@ -4629,12 +4607,12 @@
         </p:nvCxnSpPr>
         <p:spPr>
           <a:xfrm rot="16200000" flipH="1">
-            <a:off x="8185792" y="3396888"/>
-            <a:ext cx="515199" cy="579419"/>
+            <a:off x="9173342" y="2818780"/>
+            <a:ext cx="667556" cy="1026144"/>
           </a:xfrm>
           <a:prstGeom prst="bentConnector3">
             <a:avLst>
-              <a:gd name="adj1" fmla="val 50000"/>
+              <a:gd name="adj1" fmla="val 31106"/>
             </a:avLst>
           </a:prstGeom>
           <a:ln w="25400">
@@ -4690,7 +4668,7 @@
         </p:blipFill>
         <p:spPr>
           <a:xfrm>
-            <a:off x="7110684" y="2115640"/>
+            <a:off x="8424475" y="1682265"/>
             <a:ext cx="469190" cy="485240"/>
           </a:xfrm>
           <a:prstGeom prst="rect">
@@ -4726,7 +4704,7 @@
         </p:blipFill>
         <p:spPr>
           <a:xfrm>
-            <a:off x="7617087" y="2115640"/>
+            <a:off x="8930878" y="1682265"/>
             <a:ext cx="576312" cy="485240"/>
           </a:xfrm>
           <a:prstGeom prst="rect">
@@ -4762,7 +4740,7 @@
         </p:blipFill>
         <p:spPr>
           <a:xfrm>
-            <a:off x="8241122" y="2115641"/>
+            <a:off x="9554913" y="1682266"/>
             <a:ext cx="465279" cy="485239"/>
           </a:xfrm>
           <a:prstGeom prst="rect">
@@ -4798,7 +4776,7 @@
         </p:blipFill>
         <p:spPr>
           <a:xfrm>
-            <a:off x="8733101" y="2115640"/>
+            <a:off x="10046892" y="1682265"/>
             <a:ext cx="467334" cy="485240"/>
           </a:xfrm>
           <a:prstGeom prst="rect">
@@ -4817,13 +4795,12 @@
           </p:cNvPr>
           <p:cNvCxnSpPr>
             <a:cxnSpLocks/>
-            <a:stCxn id="65" idx="1"/>
           </p:cNvCxnSpPr>
           <p:nvPr/>
         </p:nvCxnSpPr>
         <p:spPr>
           <a:xfrm flipH="1">
-            <a:off x="7143136" y="4217298"/>
+            <a:off x="7819763" y="3799340"/>
             <a:ext cx="1316865" cy="0"/>
           </a:xfrm>
           <a:prstGeom prst="straightConnector1">
@@ -4854,6 +4831,49 @@
           </a:fontRef>
         </p:style>
       </p:cxnSp>
+      <p:pic>
+        <p:nvPicPr>
+          <p:cNvPr id="27" name="Graphic 26">
+            <a:extLst>
+              <a:ext uri="{FF2B5EF4-FFF2-40B4-BE49-F238E27FC236}">
+                <a16:creationId xmlns:a16="http://schemas.microsoft.com/office/drawing/2014/main" id="{8E64CE0A-A303-B24D-84CD-764C68816431}"/>
+              </a:ext>
+            </a:extLst>
+          </p:cNvPr>
+          <p:cNvPicPr>
+            <a:picLocks noChangeAspect="1"/>
+          </p:cNvPicPr>
+          <p:nvPr/>
+        </p:nvPicPr>
+        <p:blipFill>
+          <a:blip r:embed="rId16">
+            <a:extLst>
+              <a:ext uri="{96DAC541-7B7A-43D3-8B79-37D633B846F1}">
+                <asvg:svgBlip xmlns:asvg="http://schemas.microsoft.com/office/drawing/2016/SVG/main" r:embed="rId17"/>
+              </a:ext>
+            </a:extLst>
+          </a:blip>
+          <a:stretch>
+            <a:fillRect/>
+          </a:stretch>
+        </p:blipFill>
+        <p:spPr>
+          <a:xfrm>
+            <a:off x="7521948" y="1675936"/>
+            <a:ext cx="485240" cy="485240"/>
+          </a:xfrm>
+          <a:prstGeom prst="rect">
+            <a:avLst/>
+          </a:prstGeom>
+          <a:effectLst>
+            <a:outerShdw blurRad="50800" dist="50800" dir="5400000" algn="ctr" rotWithShape="0">
+              <a:srgbClr val="000000">
+                <a:alpha val="93000"/>
+              </a:srgbClr>
+            </a:outerShdw>
+          </a:effectLst>
+        </p:spPr>
+      </p:pic>
     </p:spTree>
     <p:extLst>
       <p:ext uri="{BB962C8B-B14F-4D97-AF65-F5344CB8AC3E}">

</xml_diff>